<commit_message>
Added point re: re-analysis, meta-analysis.
</commit_message>
<xml_diff>
--- a/FinalLecture.pptx
+++ b/FinalLecture.pptx
@@ -12,26 +12,27 @@
     <p:sldId id="259" r:id="rId6"/>
     <p:sldId id="262" r:id="rId7"/>
     <p:sldId id="263" r:id="rId8"/>
-    <p:sldId id="260" r:id="rId9"/>
-    <p:sldId id="264" r:id="rId10"/>
-    <p:sldId id="272" r:id="rId11"/>
-    <p:sldId id="261" r:id="rId12"/>
-    <p:sldId id="273" r:id="rId13"/>
-    <p:sldId id="274" r:id="rId14"/>
-    <p:sldId id="265" r:id="rId15"/>
-    <p:sldId id="267" r:id="rId16"/>
-    <p:sldId id="266" r:id="rId17"/>
-    <p:sldId id="269" r:id="rId18"/>
-    <p:sldId id="268" r:id="rId19"/>
-    <p:sldId id="270" r:id="rId20"/>
-    <p:sldId id="271" r:id="rId21"/>
-    <p:sldId id="276" r:id="rId22"/>
-    <p:sldId id="277" r:id="rId23"/>
-    <p:sldId id="278" r:id="rId24"/>
-    <p:sldId id="279" r:id="rId25"/>
-    <p:sldId id="280" r:id="rId26"/>
-    <p:sldId id="281" r:id="rId27"/>
-    <p:sldId id="282" r:id="rId28"/>
+    <p:sldId id="283" r:id="rId9"/>
+    <p:sldId id="260" r:id="rId10"/>
+    <p:sldId id="264" r:id="rId11"/>
+    <p:sldId id="272" r:id="rId12"/>
+    <p:sldId id="261" r:id="rId13"/>
+    <p:sldId id="273" r:id="rId14"/>
+    <p:sldId id="274" r:id="rId15"/>
+    <p:sldId id="265" r:id="rId16"/>
+    <p:sldId id="267" r:id="rId17"/>
+    <p:sldId id="266" r:id="rId18"/>
+    <p:sldId id="269" r:id="rId19"/>
+    <p:sldId id="268" r:id="rId20"/>
+    <p:sldId id="270" r:id="rId21"/>
+    <p:sldId id="271" r:id="rId22"/>
+    <p:sldId id="276" r:id="rId23"/>
+    <p:sldId id="277" r:id="rId24"/>
+    <p:sldId id="278" r:id="rId25"/>
+    <p:sldId id="279" r:id="rId26"/>
+    <p:sldId id="280" r:id="rId27"/>
+    <p:sldId id="281" r:id="rId28"/>
+    <p:sldId id="282" r:id="rId29"/>
   </p:sldIdLst>
   <p:sldSz cx="9144000" cy="6858000" type="screen4x3"/>
   <p:notesSz cx="6858000" cy="9144000"/>
@@ -6210,28 +6211,70 @@
           <a:p>
             <a:r>
               <a:rPr lang="en-US" dirty="0" smtClean="0"/>
-              <a:t>Don’t Repeat Yourself (DRY)</a:t>
-            </a:r>
-          </a:p>
-          <a:p>
-            <a:r>
-              <a:rPr lang="en-US" dirty="0" smtClean="0"/>
-              <a:t>If you’re copy-pasting a brick of code over and over, consider turning it into a function instead.</a:t>
-            </a:r>
-          </a:p>
-          <a:p>
-            <a:r>
-              <a:rPr lang="en-US" dirty="0" smtClean="0"/>
-              <a:t>You will make fewer typos this way and the code will be easier to fix.</a:t>
-            </a:r>
-            <a:endParaRPr lang="en-US" dirty="0"/>
+              <a:t>Make scripts that run from top to bottom.</a:t>
+            </a:r>
+          </a:p>
+          <a:p>
+            <a:pPr lvl="1"/>
+            <a:r>
+              <a:rPr lang="en-US" dirty="0" smtClean="0"/>
+              <a:t>Have a master script that calls the subscripts with </a:t>
+            </a:r>
+            <a:r>
+              <a:rPr lang="en-US" dirty="0" smtClean="0">
+                <a:latin typeface="Courier New" panose="02070309020205020404" pitchFamily="49" charset="0"/>
+                <a:cs typeface="Courier New" panose="02070309020205020404" pitchFamily="49" charset="0"/>
+              </a:rPr>
+              <a:t>source()</a:t>
+            </a:r>
+          </a:p>
+          <a:p>
+            <a:pPr lvl="1"/>
+            <a:r>
+              <a:rPr lang="en-US" dirty="0" smtClean="0">
+                <a:cs typeface="Courier New" panose="02070309020205020404" pitchFamily="49" charset="0"/>
+              </a:rPr>
+              <a:t>Make sure the script runs from top to bottom before the commit.</a:t>
+            </a:r>
+          </a:p>
+          <a:p>
+            <a:r>
+              <a:rPr lang="en-US" dirty="0" smtClean="0">
+                <a:cs typeface="Courier New" panose="02070309020205020404" pitchFamily="49" charset="0"/>
+              </a:rPr>
+              <a:t>Don’t use the command prompt.</a:t>
+            </a:r>
+          </a:p>
+          <a:p>
+            <a:pPr lvl="1"/>
+            <a:r>
+              <a:rPr lang="en-US" dirty="0" smtClean="0">
+                <a:cs typeface="Courier New" panose="02070309020205020404" pitchFamily="49" charset="0"/>
+              </a:rPr>
+              <a:t>I call this “</a:t>
+            </a:r>
+            <a:r>
+              <a:rPr lang="en-US" dirty="0" err="1" smtClean="0">
+                <a:cs typeface="Courier New" panose="02070309020205020404" pitchFamily="49" charset="0"/>
+              </a:rPr>
+              <a:t>barebacking</a:t>
+            </a:r>
+            <a:r>
+              <a:rPr lang="en-US" dirty="0" smtClean="0">
+                <a:cs typeface="Courier New" panose="02070309020205020404" pitchFamily="49" charset="0"/>
+              </a:rPr>
+              <a:t>” – it’s about as dangerous and about as smart.</a:t>
+            </a:r>
+            <a:endParaRPr lang="en-US" dirty="0">
+              <a:cs typeface="Courier New" panose="02070309020205020404" pitchFamily="49" charset="0"/>
+            </a:endParaRPr>
           </a:p>
         </p:txBody>
       </p:sp>
     </p:spTree>
     <p:extLst>
       <p:ext uri="{BB962C8B-B14F-4D97-AF65-F5344CB8AC3E}">
-        <p14:creationId xmlns:p14="http://schemas.microsoft.com/office/powerpoint/2010/main" val="893715849"/>
+        <p14:creationId xmlns:p14="http://schemas.microsoft.com/office/powerpoint/2010/main" val="1166675622"/>
       </p:ext>
     </p:extLst>
   </p:cSld>
@@ -6305,21 +6348,19 @@
           <a:p>
             <a:r>
               <a:rPr lang="en-US" dirty="0" smtClean="0"/>
-              <a:t>Comment your code!</a:t>
-            </a:r>
-          </a:p>
-          <a:p>
-            <a:pPr lvl="1"/>
-            <a:r>
-              <a:rPr lang="en-US" dirty="0" smtClean="0"/>
-              <a:t>Comments help other people and collaborators understand your code.</a:t>
-            </a:r>
-          </a:p>
-          <a:p>
-            <a:pPr lvl="1"/>
-            <a:r>
-              <a:rPr lang="en-US" dirty="0" smtClean="0"/>
-              <a:t>You’re going to have to come back to your code in six months after your peer review. Good luck remembering what you did!</a:t>
+              <a:t>Don’t Repeat Yourself (DRY)</a:t>
+            </a:r>
+          </a:p>
+          <a:p>
+            <a:r>
+              <a:rPr lang="en-US" dirty="0" smtClean="0"/>
+              <a:t>If you’re copy-pasting a brick of code over and over, consider turning it into a function instead.</a:t>
+            </a:r>
+          </a:p>
+          <a:p>
+            <a:r>
+              <a:rPr lang="en-US" dirty="0" smtClean="0"/>
+              <a:t>You will make fewer typos this way and the code will be easier to fix.</a:t>
             </a:r>
             <a:endParaRPr lang="en-US" dirty="0"/>
           </a:p>
@@ -6328,7 +6369,7 @@
     </p:spTree>
     <p:extLst>
       <p:ext uri="{BB962C8B-B14F-4D97-AF65-F5344CB8AC3E}">
-        <p14:creationId xmlns:p14="http://schemas.microsoft.com/office/powerpoint/2010/main" val="1890271575"/>
+        <p14:creationId xmlns:p14="http://schemas.microsoft.com/office/powerpoint/2010/main" val="893715849"/>
       </p:ext>
     </p:extLst>
   </p:cSld>
@@ -6402,29 +6443,21 @@
           <a:p>
             <a:r>
               <a:rPr lang="en-US" dirty="0" smtClean="0"/>
-              <a:t>Learn to debug</a:t>
+              <a:t>Comment your code!</a:t>
             </a:r>
           </a:p>
           <a:p>
             <a:pPr lvl="1"/>
             <a:r>
               <a:rPr lang="en-US" dirty="0" smtClean="0"/>
-              <a:t>Use print() or cat() to check on your variables.</a:t>
+              <a:t>Comments help other people and collaborators understand your code.</a:t>
             </a:r>
           </a:p>
           <a:p>
             <a:pPr lvl="1"/>
             <a:r>
               <a:rPr lang="en-US" dirty="0" smtClean="0"/>
-              <a:t>Use </a:t>
-            </a:r>
-            <a:r>
-              <a:rPr lang="en-US" dirty="0" err="1" smtClean="0"/>
-              <a:t>stopifnot</a:t>
-            </a:r>
-            <a:r>
-              <a:rPr lang="en-US" dirty="0" smtClean="0"/>
-              <a:t>() to catch errors.</a:t>
+              <a:t>You’re going to have to come back to your code in six months after your peer review. Good luck remembering what you did!</a:t>
             </a:r>
             <a:endParaRPr lang="en-US" dirty="0"/>
           </a:p>
@@ -6433,7 +6466,7 @@
     </p:spTree>
     <p:extLst>
       <p:ext uri="{BB962C8B-B14F-4D97-AF65-F5344CB8AC3E}">
-        <p14:creationId xmlns:p14="http://schemas.microsoft.com/office/powerpoint/2010/main" val="147266706"/>
+        <p14:creationId xmlns:p14="http://schemas.microsoft.com/office/powerpoint/2010/main" val="1890271575"/>
       </p:ext>
     </p:extLst>
   </p:cSld>
@@ -6507,14 +6540,29 @@
           <a:p>
             <a:r>
               <a:rPr lang="en-US" dirty="0" smtClean="0"/>
-              <a:t>Factors in R</a:t>
+              <a:t>Learn to debug</a:t>
             </a:r>
           </a:p>
           <a:p>
             <a:pPr lvl="1"/>
             <a:r>
               <a:rPr lang="en-US" dirty="0" smtClean="0"/>
-              <a:t>Factors are mean and weird and cranky. Just be careful with them.</a:t>
+              <a:t>Use print() or cat() to check on your variables.</a:t>
+            </a:r>
+          </a:p>
+          <a:p>
+            <a:pPr lvl="1"/>
+            <a:r>
+              <a:rPr lang="en-US" dirty="0" smtClean="0"/>
+              <a:t>Use </a:t>
+            </a:r>
+            <a:r>
+              <a:rPr lang="en-US" dirty="0" err="1" smtClean="0"/>
+              <a:t>stopifnot</a:t>
+            </a:r>
+            <a:r>
+              <a:rPr lang="en-US" dirty="0" smtClean="0"/>
+              <a:t>() to catch errors.</a:t>
             </a:r>
             <a:endParaRPr lang="en-US" dirty="0"/>
           </a:p>
@@ -6523,7 +6571,7 @@
     </p:spTree>
     <p:extLst>
       <p:ext uri="{BB962C8B-B14F-4D97-AF65-F5344CB8AC3E}">
-        <p14:creationId xmlns:p14="http://schemas.microsoft.com/office/powerpoint/2010/main" val="737434446"/>
+        <p14:creationId xmlns:p14="http://schemas.microsoft.com/office/powerpoint/2010/main" val="147266706"/>
       </p:ext>
     </p:extLst>
   </p:cSld>
@@ -6574,7 +6622,7 @@
           <a:p>
             <a:r>
               <a:rPr lang="en-US" dirty="0" smtClean="0"/>
-              <a:t>General Hygiene</a:t>
+              <a:t>Code Hygiene</a:t>
             </a:r>
             <a:endParaRPr lang="en-US" dirty="0"/>
           </a:p>
@@ -6597,46 +6645,14 @@
           <a:p>
             <a:r>
               <a:rPr lang="en-US" dirty="0" smtClean="0"/>
-              <a:t>Pick a naming convention and stick to it.</a:t>
+              <a:t>Factors in R</a:t>
             </a:r>
           </a:p>
           <a:p>
             <a:pPr lvl="1"/>
             <a:r>
-              <a:rPr lang="en-US" dirty="0" err="1" smtClean="0"/>
-              <a:t>ant.format</a:t>
-            </a:r>
-            <a:r>
-              <a:rPr lang="en-US" dirty="0" smtClean="0"/>
-              <a:t> (might work poorly with file extensions)</a:t>
-            </a:r>
-          </a:p>
-          <a:p>
-            <a:pPr lvl="1"/>
-            <a:r>
-              <a:rPr lang="en-US" dirty="0" err="1" smtClean="0"/>
-              <a:t>gooseneck_format</a:t>
-            </a:r>
-            <a:endParaRPr lang="en-US" dirty="0" smtClean="0"/>
-          </a:p>
-          <a:p>
-            <a:pPr lvl="1"/>
-            <a:r>
-              <a:rPr lang="en-US" dirty="0" err="1" smtClean="0"/>
-              <a:t>camelBackFormat</a:t>
-            </a:r>
-            <a:r>
-              <a:rPr lang="en-US" dirty="0" smtClean="0"/>
-              <a:t> (be consistent about leading capital)</a:t>
-            </a:r>
-          </a:p>
-          <a:p>
-            <a:endParaRPr lang="en-US" dirty="0"/>
-          </a:p>
-          <a:p>
-            <a:r>
-              <a:rPr lang="en-US" dirty="0" smtClean="0"/>
-              <a:t>Do NOT use spaces in column names, file names, folder names.</a:t>
+              <a:rPr lang="en-US" dirty="0" smtClean="0"/>
+              <a:t>Factors are mean and weird and cranky. Just be careful with them.</a:t>
             </a:r>
             <a:endParaRPr lang="en-US" dirty="0"/>
           </a:p>
@@ -6645,7 +6661,7 @@
     </p:spTree>
     <p:extLst>
       <p:ext uri="{BB962C8B-B14F-4D97-AF65-F5344CB8AC3E}">
-        <p14:creationId xmlns:p14="http://schemas.microsoft.com/office/powerpoint/2010/main" val="369966227"/>
+        <p14:creationId xmlns:p14="http://schemas.microsoft.com/office/powerpoint/2010/main" val="737434446"/>
       </p:ext>
     </p:extLst>
   </p:cSld>
@@ -6719,7 +6735,37 @@
           <a:p>
             <a:r>
               <a:rPr lang="en-US" dirty="0" smtClean="0"/>
-              <a:t>Make sure columns have the same names across (and especially within!) studies.</a:t>
+              <a:t>Pick a naming convention and stick to it.</a:t>
+            </a:r>
+          </a:p>
+          <a:p>
+            <a:pPr lvl="1"/>
+            <a:r>
+              <a:rPr lang="en-US" dirty="0" err="1" smtClean="0"/>
+              <a:t>ant.format</a:t>
+            </a:r>
+            <a:r>
+              <a:rPr lang="en-US" dirty="0" smtClean="0"/>
+              <a:t> (might work poorly with file extensions)</a:t>
+            </a:r>
+          </a:p>
+          <a:p>
+            <a:pPr lvl="1"/>
+            <a:r>
+              <a:rPr lang="en-US" dirty="0" err="1" smtClean="0"/>
+              <a:t>gooseneck_format</a:t>
+            </a:r>
+            <a:endParaRPr lang="en-US" dirty="0" smtClean="0"/>
+          </a:p>
+          <a:p>
+            <a:pPr lvl="1"/>
+            <a:r>
+              <a:rPr lang="en-US" dirty="0" err="1" smtClean="0"/>
+              <a:t>camelBackFormat</a:t>
+            </a:r>
+            <a:r>
+              <a:rPr lang="en-US" dirty="0" smtClean="0"/>
+              <a:t> (be consistent about leading capital)</a:t>
             </a:r>
           </a:p>
           <a:p>
@@ -6728,7 +6774,7 @@
           <a:p>
             <a:r>
               <a:rPr lang="en-US" dirty="0" smtClean="0"/>
-              <a:t>Make each column describe only one attribute.</a:t>
+              <a:t>Do NOT use spaces in column names, file names, folder names.</a:t>
             </a:r>
             <a:endParaRPr lang="en-US" dirty="0"/>
           </a:p>
@@ -6737,7 +6783,7 @@
     </p:spTree>
     <p:extLst>
       <p:ext uri="{BB962C8B-B14F-4D97-AF65-F5344CB8AC3E}">
-        <p14:creationId xmlns:p14="http://schemas.microsoft.com/office/powerpoint/2010/main" val="2804244708"/>
+        <p14:creationId xmlns:p14="http://schemas.microsoft.com/office/powerpoint/2010/main" val="369966227"/>
       </p:ext>
     </p:extLst>
   </p:cSld>
@@ -6811,42 +6857,16 @@
           <a:p>
             <a:r>
               <a:rPr lang="en-US" dirty="0" smtClean="0"/>
-              <a:t>When working with collaborators, give them all the columns they could possibly need.</a:t>
-            </a:r>
-          </a:p>
-          <a:p>
-            <a:r>
-              <a:rPr lang="en-US" dirty="0" smtClean="0"/>
-              <a:t>Let them </a:t>
-            </a:r>
-            <a:r>
-              <a:rPr lang="en-US" dirty="0" smtClean="0">
-                <a:latin typeface="Courier New" panose="02070309020205020404" pitchFamily="49" charset="0"/>
-                <a:cs typeface="Courier New" panose="02070309020205020404" pitchFamily="49" charset="0"/>
-              </a:rPr>
-              <a:t>select() </a:t>
-            </a:r>
-            <a:r>
-              <a:rPr lang="en-US" dirty="0" smtClean="0"/>
-              <a:t>the ones they want, or give them a script that does </a:t>
-            </a:r>
-            <a:r>
-              <a:rPr lang="en-US" dirty="0" smtClean="0">
-                <a:latin typeface="Courier New" panose="02070309020205020404" pitchFamily="49" charset="0"/>
-                <a:cs typeface="Courier New" panose="02070309020205020404" pitchFamily="49" charset="0"/>
-              </a:rPr>
-              <a:t>select()</a:t>
-            </a:r>
-            <a:r>
-              <a:rPr lang="en-US" dirty="0" smtClean="0"/>
-              <a:t> for them.</a:t>
-            </a:r>
-          </a:p>
-          <a:p>
-            <a:pPr lvl="1"/>
-            <a:r>
-              <a:rPr lang="en-US" dirty="0" smtClean="0"/>
-              <a:t>It sucks to go back and try to add columns.</a:t>
+              <a:t>Make sure columns have the same names across (and especially within!) studies.</a:t>
+            </a:r>
+          </a:p>
+          <a:p>
+            <a:endParaRPr lang="en-US" dirty="0"/>
+          </a:p>
+          <a:p>
+            <a:r>
+              <a:rPr lang="en-US" dirty="0" smtClean="0"/>
+              <a:t>Make each column describe only one attribute.</a:t>
             </a:r>
             <a:endParaRPr lang="en-US" dirty="0"/>
           </a:p>
@@ -6855,7 +6875,7 @@
     </p:spTree>
     <p:extLst>
       <p:ext uri="{BB962C8B-B14F-4D97-AF65-F5344CB8AC3E}">
-        <p14:creationId xmlns:p14="http://schemas.microsoft.com/office/powerpoint/2010/main" val="606145060"/>
+        <p14:creationId xmlns:p14="http://schemas.microsoft.com/office/powerpoint/2010/main" val="2804244708"/>
       </p:ext>
     </p:extLst>
   </p:cSld>
@@ -6891,7 +6911,7 @@
       </p:grpSpPr>
       <p:sp>
         <p:nvSpPr>
-          <p:cNvPr id="4" name="Title 3"/>
+          <p:cNvPr id="2" name="Title 1"/>
           <p:cNvSpPr>
             <a:spLocks noGrp="1"/>
           </p:cNvSpPr>
@@ -6905,74 +6925,75 @@
           <a:lstStyle/>
           <a:p>
             <a:r>
+              <a:rPr lang="en-US" dirty="0" smtClean="0"/>
+              <a:t>General Hygiene</a:t>
+            </a:r>
+            <a:endParaRPr lang="en-US" dirty="0"/>
+          </a:p>
+        </p:txBody>
+      </p:sp>
+      <p:sp>
+        <p:nvSpPr>
+          <p:cNvPr id="3" name="Content Placeholder 2"/>
+          <p:cNvSpPr>
+            <a:spLocks noGrp="1"/>
+          </p:cNvSpPr>
+          <p:nvPr>
+            <p:ph sz="quarter" idx="1"/>
+          </p:nvPr>
+        </p:nvSpPr>
+        <p:spPr/>
+        <p:txBody>
+          <a:bodyPr/>
+          <a:lstStyle/>
+          <a:p>
+            <a:r>
+              <a:rPr lang="en-US" dirty="0" smtClean="0"/>
+              <a:t>When working with collaborators, give them all the columns they could possibly need.</a:t>
+            </a:r>
+          </a:p>
+          <a:p>
+            <a:r>
+              <a:rPr lang="en-US" dirty="0" smtClean="0"/>
+              <a:t>Let them </a:t>
+            </a:r>
+            <a:r>
               <a:rPr lang="en-US" dirty="0" smtClean="0">
-                <a:solidFill>
-                  <a:schemeClr val="tx1"/>
-                </a:solidFill>
+                <a:latin typeface="Courier New" panose="02070309020205020404" pitchFamily="49" charset="0"/>
+                <a:cs typeface="Courier New" panose="02070309020205020404" pitchFamily="49" charset="0"/>
               </a:rPr>
-              <a:t>Master the </a:t>
-            </a:r>
-            <a:r>
-              <a:rPr lang="en-US" dirty="0" err="1" smtClean="0">
-                <a:solidFill>
-                  <a:schemeClr val="tx1"/>
-                </a:solidFill>
+              <a:t>select() </a:t>
+            </a:r>
+            <a:r>
+              <a:rPr lang="en-US" dirty="0" smtClean="0"/>
+              <a:t>the ones they want, or give them a script that does </a:t>
+            </a:r>
+            <a:r>
+              <a:rPr lang="en-US" dirty="0" smtClean="0">
+                <a:latin typeface="Courier New" panose="02070309020205020404" pitchFamily="49" charset="0"/>
+                <a:cs typeface="Courier New" panose="02070309020205020404" pitchFamily="49" charset="0"/>
               </a:rPr>
-              <a:t>Hadleyverse</a:t>
-            </a:r>
-            <a:endParaRPr lang="en-US" dirty="0">
-              <a:solidFill>
-                <a:schemeClr val="tx1"/>
-              </a:solidFill>
-            </a:endParaRPr>
-          </a:p>
-        </p:txBody>
-      </p:sp>
-      <p:pic>
-        <p:nvPicPr>
-          <p:cNvPr id="2050" name="Picture 2" descr="https://camo.githubusercontent.com/e29219823036f4a91aa48726cf8b53148bf1d25c/687474703a2f2f692e696d6775722e636f6d2f4472496c522e706e67"/>
-          <p:cNvPicPr>
-            <a:picLocks noChangeAspect="1" noChangeArrowheads="1"/>
-          </p:cNvPicPr>
-          <p:nvPr/>
-        </p:nvPicPr>
-        <p:blipFill>
-          <a:blip r:embed="rId2">
-            <a:extLst>
-              <a:ext uri="{28A0092B-C50C-407E-A947-70E740481C1C}">
-                <a14:useLocalDpi xmlns:a14="http://schemas.microsoft.com/office/drawing/2010/main" val="0"/>
-              </a:ext>
-            </a:extLst>
-          </a:blip>
-          <a:srcRect/>
-          <a:stretch>
-            <a:fillRect/>
-          </a:stretch>
-        </p:blipFill>
-        <p:spPr bwMode="auto">
-          <a:xfrm>
-            <a:off x="3352800" y="2667000"/>
-            <a:ext cx="2438400" cy="3580286"/>
-          </a:xfrm>
-          <a:prstGeom prst="rect">
-            <a:avLst/>
-          </a:prstGeom>
-          <a:noFill/>
-          <a:extLst>
-            <a:ext uri="{909E8E84-426E-40DD-AFC4-6F175D3DCCD1}">
-              <a14:hiddenFill xmlns:a14="http://schemas.microsoft.com/office/drawing/2010/main">
-                <a:solidFill>
-                  <a:srgbClr val="FFFFFF"/>
-                </a:solidFill>
-              </a14:hiddenFill>
-            </a:ext>
-          </a:extLst>
-        </p:spPr>
-      </p:pic>
+              <a:t>select()</a:t>
+            </a:r>
+            <a:r>
+              <a:rPr lang="en-US" dirty="0" smtClean="0"/>
+              <a:t> for them.</a:t>
+            </a:r>
+          </a:p>
+          <a:p>
+            <a:pPr lvl="1"/>
+            <a:r>
+              <a:rPr lang="en-US" dirty="0" smtClean="0"/>
+              <a:t>It sucks to go back and try to add columns.</a:t>
+            </a:r>
+            <a:endParaRPr lang="en-US" dirty="0"/>
+          </a:p>
+        </p:txBody>
+      </p:sp>
     </p:spTree>
     <p:extLst>
       <p:ext uri="{BB962C8B-B14F-4D97-AF65-F5344CB8AC3E}">
-        <p14:creationId xmlns:p14="http://schemas.microsoft.com/office/powerpoint/2010/main" val="21495149"/>
+        <p14:creationId xmlns:p14="http://schemas.microsoft.com/office/powerpoint/2010/main" val="606145060"/>
       </p:ext>
     </p:extLst>
   </p:cSld>
@@ -7008,7 +7029,7 @@
       </p:grpSpPr>
       <p:sp>
         <p:nvSpPr>
-          <p:cNvPr id="2" name="Title 1"/>
+          <p:cNvPr id="4" name="Title 3"/>
           <p:cNvSpPr>
             <a:spLocks noGrp="1"/>
           </p:cNvSpPr>
@@ -7022,67 +7043,36 @@
           <a:lstStyle/>
           <a:p>
             <a:r>
-              <a:rPr lang="en-US" dirty="0" smtClean="0"/>
+              <a:rPr lang="en-US" dirty="0" smtClean="0">
+                <a:solidFill>
+                  <a:schemeClr val="tx1"/>
+                </a:solidFill>
+              </a:rPr>
               <a:t>Master the </a:t>
             </a:r>
             <a:r>
-              <a:rPr lang="en-US" dirty="0" err="1" smtClean="0"/>
+              <a:rPr lang="en-US" dirty="0" err="1" smtClean="0">
+                <a:solidFill>
+                  <a:schemeClr val="tx1"/>
+                </a:solidFill>
+              </a:rPr>
               <a:t>Hadleyverse</a:t>
             </a:r>
-            <a:endParaRPr lang="en-US" dirty="0"/>
-          </a:p>
-        </p:txBody>
-      </p:sp>
-      <p:sp>
-        <p:nvSpPr>
-          <p:cNvPr id="4" name="Content Placeholder 3"/>
-          <p:cNvSpPr>
-            <a:spLocks noGrp="1"/>
-          </p:cNvSpPr>
-          <p:nvPr>
-            <p:ph sz="half" idx="1"/>
-          </p:nvPr>
-        </p:nvSpPr>
-        <p:spPr/>
-        <p:txBody>
-          <a:bodyPr/>
-          <a:lstStyle/>
-          <a:p>
-            <a:r>
-              <a:rPr lang="en-US" dirty="0" err="1" smtClean="0"/>
-              <a:t>tidyr</a:t>
-            </a:r>
-            <a:r>
-              <a:rPr lang="en-US" dirty="0" smtClean="0"/>
-              <a:t>, </a:t>
-            </a:r>
-            <a:r>
-              <a:rPr lang="en-US" dirty="0" err="1" smtClean="0"/>
-              <a:t>dplyr</a:t>
-            </a:r>
-            <a:r>
-              <a:rPr lang="en-US" dirty="0" smtClean="0"/>
-              <a:t>, and ggplot2 are the Deathly Hallows of Data Analysis</a:t>
-            </a:r>
-          </a:p>
-          <a:p>
-            <a:r>
-              <a:rPr lang="en-US" dirty="0" smtClean="0"/>
-              <a:t>If you master all three, you will be an incredible data wizard.</a:t>
-            </a:r>
-            <a:endParaRPr lang="en-US" dirty="0"/>
+            <a:endParaRPr lang="en-US" dirty="0">
+              <a:solidFill>
+                <a:schemeClr val="tx1"/>
+              </a:solidFill>
+            </a:endParaRPr>
           </a:p>
         </p:txBody>
       </p:sp>
       <p:pic>
         <p:nvPicPr>
-          <p:cNvPr id="3074" name="Picture 2" descr="https://encrypted-tbn1.gstatic.com/images?q=tbn:ANd9GcQK_G0ZhMqsAJvXSWriPOCcRR50MxTZhzLC3dy8r2J_YDzaO2SH"/>
+          <p:cNvPr id="2050" name="Picture 2" descr="https://camo.githubusercontent.com/e29219823036f4a91aa48726cf8b53148bf1d25c/687474703a2f2f692e696d6775722e636f6d2f4472496c522e706e67"/>
           <p:cNvPicPr>
-            <a:picLocks noGrp="1" noChangeAspect="1" noChangeArrowheads="1"/>
+            <a:picLocks noChangeAspect="1" noChangeArrowheads="1"/>
           </p:cNvPicPr>
-          <p:nvPr>
-            <p:ph sz="half" idx="2"/>
-          </p:nvPr>
+          <p:nvPr/>
         </p:nvPicPr>
         <p:blipFill>
           <a:blip r:embed="rId2">
@@ -7099,18 +7089,13 @@
         </p:blipFill>
         <p:spPr bwMode="auto">
           <a:xfrm>
-            <a:off x="5672137" y="2717006"/>
-            <a:ext cx="2295525" cy="1990725"/>
+            <a:off x="3352800" y="2667000"/>
+            <a:ext cx="2438400" cy="3580286"/>
           </a:xfrm>
           <a:prstGeom prst="rect">
             <a:avLst/>
           </a:prstGeom>
           <a:noFill/>
-          <a:ln>
-            <a:solidFill>
-              <a:schemeClr val="tx1"/>
-            </a:solidFill>
-          </a:ln>
           <a:extLst>
             <a:ext uri="{909E8E84-426E-40DD-AFC4-6F175D3DCCD1}">
               <a14:hiddenFill xmlns:a14="http://schemas.microsoft.com/office/drawing/2010/main">
@@ -7125,7 +7110,7 @@
     </p:spTree>
     <p:extLst>
       <p:ext uri="{BB962C8B-B14F-4D97-AF65-F5344CB8AC3E}">
-        <p14:creationId xmlns:p14="http://schemas.microsoft.com/office/powerpoint/2010/main" val="884950451"/>
+        <p14:creationId xmlns:p14="http://schemas.microsoft.com/office/powerpoint/2010/main" val="21495149"/>
       </p:ext>
     </p:extLst>
   </p:cSld>
@@ -7193,15 +7178,10 @@
             <a:spLocks noGrp="1"/>
           </p:cNvSpPr>
           <p:nvPr>
-            <p:ph sz="quarter" idx="1"/>
-          </p:nvPr>
-        </p:nvSpPr>
-        <p:spPr>
-          <a:xfrm>
-            <a:off x="228600" y="3810000"/>
-            <a:ext cx="8577072" cy="2289048"/>
-          </a:xfrm>
-        </p:spPr>
+            <p:ph sz="half" idx="1"/>
+          </p:nvPr>
+        </p:nvSpPr>
+        <p:spPr/>
         <p:txBody>
           <a:bodyPr/>
           <a:lstStyle/>
@@ -7212,23 +7192,21 @@
             </a:r>
             <a:r>
               <a:rPr lang="en-US" dirty="0" smtClean="0"/>
-              <a:t>: The Philosopher’s Stone. Columns into rows.</a:t>
-            </a:r>
-          </a:p>
-          <a:p>
+              <a:t>, </a:t>
+            </a:r>
             <a:r>
               <a:rPr lang="en-US" dirty="0" err="1" smtClean="0"/>
               <a:t>dplyr</a:t>
             </a:r>
             <a:r>
               <a:rPr lang="en-US" dirty="0" smtClean="0"/>
-              <a:t>: The Wand of Death. Kill bad rows, mutate cols.</a:t>
-            </a:r>
-          </a:p>
-          <a:p>
-            <a:r>
-              <a:rPr lang="en-US" dirty="0" smtClean="0"/>
-              <a:t>ggplot2: The Cloak of (In)visibility. See your data.</a:t>
+              <a:t>, and ggplot2 are the Deathly Hallows of Data Analysis</a:t>
+            </a:r>
+          </a:p>
+          <a:p>
+            <a:r>
+              <a:rPr lang="en-US" dirty="0" smtClean="0"/>
+              <a:t>If you master all three, you will be an incredible data wizard.</a:t>
             </a:r>
             <a:endParaRPr lang="en-US" dirty="0"/>
           </a:p>
@@ -7241,7 +7219,7 @@
             <a:picLocks noGrp="1" noChangeAspect="1" noChangeArrowheads="1"/>
           </p:cNvPicPr>
           <p:nvPr>
-            <p:ph sz="half" idx="4294967295"/>
+            <p:ph sz="half" idx="2"/>
           </p:nvPr>
         </p:nvPicPr>
         <p:blipFill>
@@ -7259,7 +7237,7 @@
         </p:blipFill>
         <p:spPr bwMode="auto">
           <a:xfrm>
-            <a:off x="3429000" y="1676400"/>
+            <a:off x="5672137" y="2717006"/>
             <a:ext cx="2295525" cy="1990725"/>
           </a:xfrm>
           <a:prstGeom prst="rect">
@@ -7285,7 +7263,7 @@
     </p:spTree>
     <p:extLst>
       <p:ext uri="{BB962C8B-B14F-4D97-AF65-F5344CB8AC3E}">
-        <p14:creationId xmlns:p14="http://schemas.microsoft.com/office/powerpoint/2010/main" val="632777513"/>
+        <p14:creationId xmlns:p14="http://schemas.microsoft.com/office/powerpoint/2010/main" val="884950451"/>
       </p:ext>
     </p:extLst>
   </p:cSld>
@@ -7429,12 +7407,12 @@
       </p:grpSpPr>
       <p:sp>
         <p:nvSpPr>
-          <p:cNvPr id="5" name="Text Placeholder 4"/>
-          <p:cNvSpPr>
-            <a:spLocks noGrp="1"/>
-          </p:cNvSpPr>
-          <p:nvPr>
-            <p:ph type="body" idx="1"/>
+          <p:cNvPr id="2" name="Title 1"/>
+          <p:cNvSpPr>
+            <a:spLocks noGrp="1"/>
+          </p:cNvSpPr>
+          <p:nvPr>
+            <p:ph type="title"/>
           </p:nvPr>
         </p:nvSpPr>
         <p:spPr/>
@@ -7442,37 +7420,118 @@
           <a:bodyPr/>
           <a:lstStyle/>
           <a:p>
-            <a:endParaRPr lang="en-US"/>
-          </a:p>
-        </p:txBody>
-      </p:sp>
-      <p:sp>
-        <p:nvSpPr>
-          <p:cNvPr id="4" name="Title 3"/>
-          <p:cNvSpPr>
-            <a:spLocks noGrp="1"/>
-          </p:cNvSpPr>
-          <p:nvPr>
-            <p:ph type="title"/>
-          </p:nvPr>
-        </p:nvSpPr>
-        <p:spPr/>
-        <p:txBody>
-          <a:bodyPr/>
-          <a:lstStyle/>
-          <a:p>
-            <a:r>
-              <a:rPr lang="en-US" dirty="0" smtClean="0"/>
-              <a:t>Use Social Media</a:t>
+            <a:r>
+              <a:rPr lang="en-US" dirty="0" smtClean="0"/>
+              <a:t>Master the </a:t>
+            </a:r>
+            <a:r>
+              <a:rPr lang="en-US" dirty="0" err="1" smtClean="0"/>
+              <a:t>Hadleyverse</a:t>
             </a:r>
             <a:endParaRPr lang="en-US" dirty="0"/>
           </a:p>
         </p:txBody>
       </p:sp>
+      <p:sp>
+        <p:nvSpPr>
+          <p:cNvPr id="4" name="Content Placeholder 3"/>
+          <p:cNvSpPr>
+            <a:spLocks noGrp="1"/>
+          </p:cNvSpPr>
+          <p:nvPr>
+            <p:ph sz="quarter" idx="1"/>
+          </p:nvPr>
+        </p:nvSpPr>
+        <p:spPr>
+          <a:xfrm>
+            <a:off x="228600" y="3810000"/>
+            <a:ext cx="8577072" cy="2289048"/>
+          </a:xfrm>
+        </p:spPr>
+        <p:txBody>
+          <a:bodyPr/>
+          <a:lstStyle/>
+          <a:p>
+            <a:r>
+              <a:rPr lang="en-US" dirty="0" err="1" smtClean="0"/>
+              <a:t>tidyr</a:t>
+            </a:r>
+            <a:r>
+              <a:rPr lang="en-US" dirty="0" smtClean="0"/>
+              <a:t>: The Philosopher’s Stone. Columns into rows.</a:t>
+            </a:r>
+          </a:p>
+          <a:p>
+            <a:r>
+              <a:rPr lang="en-US" dirty="0" err="1" smtClean="0"/>
+              <a:t>dplyr</a:t>
+            </a:r>
+            <a:r>
+              <a:rPr lang="en-US" dirty="0" smtClean="0"/>
+              <a:t>: The Wand of Death. Kill bad rows, mutate cols.</a:t>
+            </a:r>
+          </a:p>
+          <a:p>
+            <a:r>
+              <a:rPr lang="en-US" dirty="0" smtClean="0"/>
+              <a:t>ggplot2: The Cloak of (In)visibility. See your data.</a:t>
+            </a:r>
+            <a:endParaRPr lang="en-US" dirty="0"/>
+          </a:p>
+        </p:txBody>
+      </p:sp>
+      <p:pic>
+        <p:nvPicPr>
+          <p:cNvPr id="3074" name="Picture 2" descr="https://encrypted-tbn1.gstatic.com/images?q=tbn:ANd9GcQK_G0ZhMqsAJvXSWriPOCcRR50MxTZhzLC3dy8r2J_YDzaO2SH"/>
+          <p:cNvPicPr>
+            <a:picLocks noGrp="1" noChangeAspect="1" noChangeArrowheads="1"/>
+          </p:cNvPicPr>
+          <p:nvPr>
+            <p:ph sz="half" idx="4294967295"/>
+          </p:nvPr>
+        </p:nvPicPr>
+        <p:blipFill>
+          <a:blip r:embed="rId2">
+            <a:extLst>
+              <a:ext uri="{28A0092B-C50C-407E-A947-70E740481C1C}">
+                <a14:useLocalDpi xmlns:a14="http://schemas.microsoft.com/office/drawing/2010/main" val="0"/>
+              </a:ext>
+            </a:extLst>
+          </a:blip>
+          <a:srcRect/>
+          <a:stretch>
+            <a:fillRect/>
+          </a:stretch>
+        </p:blipFill>
+        <p:spPr bwMode="auto">
+          <a:xfrm>
+            <a:off x="3429000" y="1676400"/>
+            <a:ext cx="2295525" cy="1990725"/>
+          </a:xfrm>
+          <a:prstGeom prst="rect">
+            <a:avLst/>
+          </a:prstGeom>
+          <a:noFill/>
+          <a:ln>
+            <a:solidFill>
+              <a:schemeClr val="tx1"/>
+            </a:solidFill>
+          </a:ln>
+          <a:extLst>
+            <a:ext uri="{909E8E84-426E-40DD-AFC4-6F175D3DCCD1}">
+              <a14:hiddenFill xmlns:a14="http://schemas.microsoft.com/office/drawing/2010/main">
+                <a:solidFill>
+                  <a:srgbClr val="FFFFFF"/>
+                </a:solidFill>
+              </a14:hiddenFill>
+            </a:ext>
+          </a:extLst>
+        </p:spPr>
+      </p:pic>
     </p:spTree>
     <p:extLst>
       <p:ext uri="{BB962C8B-B14F-4D97-AF65-F5344CB8AC3E}">
-        <p14:creationId xmlns:p14="http://schemas.microsoft.com/office/powerpoint/2010/main" val="2775537898"/>
+        <p14:creationId xmlns:p14="http://schemas.microsoft.com/office/powerpoint/2010/main" val="632777513"/>
       </p:ext>
     </p:extLst>
   </p:cSld>
@@ -7508,6 +7567,25 @@
       </p:grpSpPr>
       <p:sp>
         <p:nvSpPr>
+          <p:cNvPr id="5" name="Text Placeholder 4"/>
+          <p:cNvSpPr>
+            <a:spLocks noGrp="1"/>
+          </p:cNvSpPr>
+          <p:nvPr>
+            <p:ph type="body" idx="1"/>
+          </p:nvPr>
+        </p:nvSpPr>
+        <p:spPr/>
+        <p:txBody>
+          <a:bodyPr/>
+          <a:lstStyle/>
+          <a:p>
+            <a:endParaRPr lang="en-US"/>
+          </a:p>
+        </p:txBody>
+      </p:sp>
+      <p:sp>
+        <p:nvSpPr>
           <p:cNvPr id="4" name="Title 3"/>
           <p:cNvSpPr>
             <a:spLocks noGrp="1"/>
@@ -7524,81 +7602,6 @@
             <a:r>
               <a:rPr lang="en-US" dirty="0" smtClean="0"/>
               <a:t>Use Social Media</a:t>
-            </a:r>
-            <a:endParaRPr lang="en-US" dirty="0"/>
-          </a:p>
-        </p:txBody>
-      </p:sp>
-      <p:sp>
-        <p:nvSpPr>
-          <p:cNvPr id="5" name="Content Placeholder 4"/>
-          <p:cNvSpPr>
-            <a:spLocks noGrp="1"/>
-          </p:cNvSpPr>
-          <p:nvPr>
-            <p:ph sz="quarter" idx="1"/>
-          </p:nvPr>
-        </p:nvSpPr>
-        <p:spPr/>
-        <p:txBody>
-          <a:bodyPr/>
-          <a:lstStyle/>
-          <a:p>
-            <a:r>
-              <a:rPr lang="en-US" dirty="0" smtClean="0"/>
-              <a:t>GitHub</a:t>
-            </a:r>
-          </a:p>
-          <a:p>
-            <a:pPr lvl="1"/>
-            <a:r>
-              <a:rPr lang="en-US" dirty="0" smtClean="0"/>
-              <a:t>Shows everyone you know how to code</a:t>
-            </a:r>
-          </a:p>
-          <a:p>
-            <a:r>
-              <a:rPr lang="en-US" dirty="0" smtClean="0"/>
-              <a:t>Twitter</a:t>
-            </a:r>
-          </a:p>
-          <a:p>
-            <a:pPr lvl="1"/>
-            <a:r>
-              <a:rPr lang="en-US" dirty="0" smtClean="0"/>
-              <a:t>Keeps you up to date on the literature much faster than the journals</a:t>
-            </a:r>
-          </a:p>
-          <a:p>
-            <a:r>
-              <a:rPr lang="en-US" dirty="0" err="1" smtClean="0"/>
-              <a:t>StackExchange</a:t>
-            </a:r>
-            <a:endParaRPr lang="en-US" dirty="0" smtClean="0"/>
-          </a:p>
-          <a:p>
-            <a:pPr lvl="1"/>
-            <a:r>
-              <a:rPr lang="en-US" dirty="0" smtClean="0"/>
-              <a:t>Your question has already been answered.</a:t>
-            </a:r>
-          </a:p>
-          <a:p>
-            <a:pPr lvl="1"/>
-            <a:r>
-              <a:rPr lang="en-US" dirty="0" smtClean="0"/>
-              <a:t>If not, experts </a:t>
-            </a:r>
-            <a:r>
-              <a:rPr lang="en-US" dirty="0" smtClean="0"/>
-              <a:t>are dying to answer your questions for meaningless internet points.</a:t>
-            </a:r>
-          </a:p>
-          <a:p>
-            <a:pPr lvl="1"/>
-            <a:r>
-              <a:rPr lang="en-US" dirty="0" smtClean="0"/>
-              <a:t>You can earn meaningless internet points by asking good questions.</a:t>
             </a:r>
             <a:endParaRPr lang="en-US" dirty="0"/>
           </a:p>
@@ -7607,7 +7610,7 @@
     </p:spTree>
     <p:extLst>
       <p:ext uri="{BB962C8B-B14F-4D97-AF65-F5344CB8AC3E}">
-        <p14:creationId xmlns:p14="http://schemas.microsoft.com/office/powerpoint/2010/main" val="1616142445"/>
+        <p14:creationId xmlns:p14="http://schemas.microsoft.com/office/powerpoint/2010/main" val="2775537898"/>
       </p:ext>
     </p:extLst>
   </p:cSld>
@@ -7643,12 +7646,12 @@
       </p:grpSpPr>
       <p:sp>
         <p:nvSpPr>
-          <p:cNvPr id="5" name="Text Placeholder 4"/>
-          <p:cNvSpPr>
-            <a:spLocks noGrp="1"/>
-          </p:cNvSpPr>
-          <p:nvPr>
-            <p:ph type="body" idx="1"/>
+          <p:cNvPr id="4" name="Title 3"/>
+          <p:cNvSpPr>
+            <a:spLocks noGrp="1"/>
+          </p:cNvSpPr>
+          <p:nvPr>
+            <p:ph type="title"/>
           </p:nvPr>
         </p:nvSpPr>
         <p:spPr/>
@@ -7656,18 +7659,22 @@
           <a:bodyPr/>
           <a:lstStyle/>
           <a:p>
-            <a:endParaRPr lang="en-US"/>
-          </a:p>
-        </p:txBody>
-      </p:sp>
-      <p:sp>
-        <p:nvSpPr>
-          <p:cNvPr id="4" name="Title 3"/>
-          <p:cNvSpPr>
-            <a:spLocks noGrp="1"/>
-          </p:cNvSpPr>
-          <p:nvPr>
-            <p:ph type="title"/>
+            <a:r>
+              <a:rPr lang="en-US" dirty="0" smtClean="0"/>
+              <a:t>Use Social Media</a:t>
+            </a:r>
+            <a:endParaRPr lang="en-US" dirty="0"/>
+          </a:p>
+        </p:txBody>
+      </p:sp>
+      <p:sp>
+        <p:nvSpPr>
+          <p:cNvPr id="5" name="Content Placeholder 4"/>
+          <p:cNvSpPr>
+            <a:spLocks noGrp="1"/>
+          </p:cNvSpPr>
+          <p:nvPr>
+            <p:ph sz="quarter" idx="1"/>
           </p:nvPr>
         </p:nvSpPr>
         <p:spPr/>
@@ -7677,7 +7684,55 @@
           <a:p>
             <a:r>
               <a:rPr lang="en-US" dirty="0" smtClean="0"/>
-              <a:t>Be Honest with Yourself</a:t>
+              <a:t>GitHub</a:t>
+            </a:r>
+          </a:p>
+          <a:p>
+            <a:pPr lvl="1"/>
+            <a:r>
+              <a:rPr lang="en-US" dirty="0" smtClean="0"/>
+              <a:t>Shows everyone you know how to code</a:t>
+            </a:r>
+          </a:p>
+          <a:p>
+            <a:r>
+              <a:rPr lang="en-US" dirty="0" smtClean="0"/>
+              <a:t>Twitter</a:t>
+            </a:r>
+          </a:p>
+          <a:p>
+            <a:pPr lvl="1"/>
+            <a:r>
+              <a:rPr lang="en-US" dirty="0" smtClean="0"/>
+              <a:t>Keeps you up to date on the literature much faster than the journals</a:t>
+            </a:r>
+          </a:p>
+          <a:p>
+            <a:r>
+              <a:rPr lang="en-US" dirty="0" err="1" smtClean="0"/>
+              <a:t>StackExchange</a:t>
+            </a:r>
+            <a:endParaRPr lang="en-US" dirty="0" smtClean="0"/>
+          </a:p>
+          <a:p>
+            <a:pPr lvl="1"/>
+            <a:r>
+              <a:rPr lang="en-US" dirty="0" smtClean="0"/>
+              <a:t>Your question has already been answered.</a:t>
+            </a:r>
+          </a:p>
+          <a:p>
+            <a:pPr lvl="1"/>
+            <a:r>
+              <a:rPr lang="en-US" dirty="0" smtClean="0"/>
+              <a:t>If not, experts are dying to answer your questions for meaningless internet points.</a:t>
+            </a:r>
+          </a:p>
+          <a:p>
+            <a:pPr lvl="1"/>
+            <a:r>
+              <a:rPr lang="en-US" dirty="0" smtClean="0"/>
+              <a:t>You can earn meaningless internet points by asking good questions.</a:t>
             </a:r>
             <a:endParaRPr lang="en-US" dirty="0"/>
           </a:p>
@@ -7686,7 +7741,7 @@
     </p:spTree>
     <p:extLst>
       <p:ext uri="{BB962C8B-B14F-4D97-AF65-F5344CB8AC3E}">
-        <p14:creationId xmlns:p14="http://schemas.microsoft.com/office/powerpoint/2010/main" val="2001101688"/>
+        <p14:creationId xmlns:p14="http://schemas.microsoft.com/office/powerpoint/2010/main" val="1616142445"/>
       </p:ext>
     </p:extLst>
   </p:cSld>
@@ -7722,6 +7777,25 @@
       </p:grpSpPr>
       <p:sp>
         <p:nvSpPr>
+          <p:cNvPr id="5" name="Text Placeholder 4"/>
+          <p:cNvSpPr>
+            <a:spLocks noGrp="1"/>
+          </p:cNvSpPr>
+          <p:nvPr>
+            <p:ph type="body" idx="1"/>
+          </p:nvPr>
+        </p:nvSpPr>
+        <p:spPr/>
+        <p:txBody>
+          <a:bodyPr/>
+          <a:lstStyle/>
+          <a:p>
+            <a:endParaRPr lang="en-US"/>
+          </a:p>
+        </p:txBody>
+      </p:sp>
+      <p:sp>
+        <p:nvSpPr>
           <p:cNvPr id="4" name="Title 3"/>
           <p:cNvSpPr>
             <a:spLocks noGrp="1"/>
@@ -7737,52 +7811,7 @@
           <a:p>
             <a:r>
               <a:rPr lang="en-US" dirty="0" smtClean="0"/>
-              <a:t>Being Honest</a:t>
-            </a:r>
-            <a:endParaRPr lang="en-US" dirty="0"/>
-          </a:p>
-        </p:txBody>
-      </p:sp>
-      <p:sp>
-        <p:nvSpPr>
-          <p:cNvPr id="5" name="Content Placeholder 4"/>
-          <p:cNvSpPr>
-            <a:spLocks noGrp="1"/>
-          </p:cNvSpPr>
-          <p:nvPr>
-            <p:ph sz="quarter" idx="1"/>
-          </p:nvPr>
-        </p:nvSpPr>
-        <p:spPr/>
-        <p:txBody>
-          <a:bodyPr/>
-          <a:lstStyle/>
-          <a:p>
-            <a:r>
-              <a:rPr lang="en-US" dirty="0" smtClean="0"/>
-              <a:t>Be careful with language</a:t>
-            </a:r>
-          </a:p>
-          <a:p>
-            <a:pPr lvl="1"/>
-            <a:r>
-              <a:rPr lang="en-US" dirty="0" smtClean="0"/>
-              <a:t>Don’t say “reliable” when you mean “statistically significant.”</a:t>
-            </a:r>
-          </a:p>
-          <a:p>
-            <a:pPr lvl="1"/>
-            <a:r>
-              <a:rPr lang="en-US" dirty="0" smtClean="0"/>
-              <a:t>Know the definition of </a:t>
-            </a:r>
-            <a:r>
-              <a:rPr lang="en-US" i="1" dirty="0" smtClean="0"/>
-              <a:t>p-</a:t>
-            </a:r>
-            <a:r>
-              <a:rPr lang="en-US" dirty="0" smtClean="0"/>
-              <a:t>value and of confidence interval.</a:t>
+              <a:t>Be Honest with Yourself</a:t>
             </a:r>
             <a:endParaRPr lang="en-US" dirty="0"/>
           </a:p>
@@ -7791,7 +7820,7 @@
     </p:spTree>
     <p:extLst>
       <p:ext uri="{BB962C8B-B14F-4D97-AF65-F5344CB8AC3E}">
-        <p14:creationId xmlns:p14="http://schemas.microsoft.com/office/powerpoint/2010/main" val="3537142000"/>
+        <p14:creationId xmlns:p14="http://schemas.microsoft.com/office/powerpoint/2010/main" val="2001101688"/>
       </p:ext>
     </p:extLst>
   </p:cSld>
@@ -7827,7 +7856,7 @@
       </p:grpSpPr>
       <p:sp>
         <p:nvSpPr>
-          <p:cNvPr id="2" name="Title 1"/>
+          <p:cNvPr id="4" name="Title 3"/>
           <p:cNvSpPr>
             <a:spLocks noGrp="1"/>
           </p:cNvSpPr>
@@ -7850,7 +7879,7 @@
       </p:sp>
       <p:sp>
         <p:nvSpPr>
-          <p:cNvPr id="3" name="Content Placeholder 2"/>
+          <p:cNvPr id="5" name="Content Placeholder 4"/>
           <p:cNvSpPr>
             <a:spLocks noGrp="1"/>
           </p:cNvSpPr>
@@ -7865,25 +7894,29 @@
           <a:p>
             <a:r>
               <a:rPr lang="en-US" dirty="0" smtClean="0"/>
-              <a:t>If you have to transform the data 80 ways to find evidence, do you really have evidence?</a:t>
-            </a:r>
-          </a:p>
-          <a:p>
-            <a:endParaRPr lang="en-US" dirty="0" smtClean="0"/>
-          </a:p>
-          <a:p>
-            <a:r>
-              <a:rPr lang="en-US" dirty="0" smtClean="0"/>
-              <a:t>If it only holds in a very specific subgroup or complex interaction, do you think that will replicate?</a:t>
-            </a:r>
-          </a:p>
-          <a:p>
-            <a:endParaRPr lang="en-US" dirty="0" smtClean="0"/>
-          </a:p>
-          <a:p>
-            <a:r>
-              <a:rPr lang="en-US" dirty="0" smtClean="0"/>
-              <a:t>You can get honest and interesting null results published.</a:t>
+              <a:t>Be careful with language</a:t>
+            </a:r>
+          </a:p>
+          <a:p>
+            <a:pPr lvl="1"/>
+            <a:r>
+              <a:rPr lang="en-US" dirty="0" smtClean="0"/>
+              <a:t>Don’t say “reliable” when you mean “statistically significant.”</a:t>
+            </a:r>
+          </a:p>
+          <a:p>
+            <a:pPr lvl="1"/>
+            <a:r>
+              <a:rPr lang="en-US" dirty="0" smtClean="0"/>
+              <a:t>Know the definition of </a:t>
+            </a:r>
+            <a:r>
+              <a:rPr lang="en-US" i="1" dirty="0" smtClean="0"/>
+              <a:t>p-</a:t>
+            </a:r>
+            <a:r>
+              <a:rPr lang="en-US" dirty="0" smtClean="0"/>
+              <a:t>value and of confidence interval.</a:t>
             </a:r>
             <a:endParaRPr lang="en-US" dirty="0"/>
           </a:p>
@@ -7892,7 +7925,7 @@
     </p:spTree>
     <p:extLst>
       <p:ext uri="{BB962C8B-B14F-4D97-AF65-F5344CB8AC3E}">
-        <p14:creationId xmlns:p14="http://schemas.microsoft.com/office/powerpoint/2010/main" val="458402555"/>
+        <p14:creationId xmlns:p14="http://schemas.microsoft.com/office/powerpoint/2010/main" val="3537142000"/>
       </p:ext>
     </p:extLst>
   </p:cSld>
@@ -7966,50 +7999,25 @@
           <a:p>
             <a:r>
               <a:rPr lang="en-US" dirty="0" smtClean="0"/>
-              <a:t>There’s a lot of crap going on out there.</a:t>
-            </a:r>
+              <a:t>If you have to transform the data 80 ways to find evidence, do you really have evidence?</a:t>
+            </a:r>
+          </a:p>
+          <a:p>
             <a:endParaRPr lang="en-US" dirty="0" smtClean="0"/>
           </a:p>
           <a:p>
-            <a:pPr lvl="1"/>
-            <a:r>
-              <a:rPr lang="en-US" dirty="0" err="1" smtClean="0"/>
-              <a:t>HARKing</a:t>
-            </a:r>
+            <a:r>
+              <a:rPr lang="en-US" dirty="0" smtClean="0"/>
+              <a:t>If it only holds in a very specific subgroup or complex interaction, do you think that will replicate?</a:t>
+            </a:r>
+          </a:p>
+          <a:p>
             <a:endParaRPr lang="en-US" dirty="0" smtClean="0"/>
           </a:p>
           <a:p>
-            <a:pPr lvl="1"/>
-            <a:r>
-              <a:rPr lang="en-US" dirty="0" smtClean="0"/>
-              <a:t>Moderator munging</a:t>
-            </a:r>
-          </a:p>
-          <a:p>
-            <a:pPr lvl="1"/>
-            <a:r>
-              <a:rPr lang="en-US" dirty="0" smtClean="0"/>
-              <a:t>Optional stopping</a:t>
-            </a:r>
-          </a:p>
-          <a:p>
-            <a:pPr lvl="1"/>
-            <a:r>
-              <a:rPr lang="en-US" dirty="0" smtClean="0"/>
-              <a:t>One-tailed tests (even F-tests!)</a:t>
-            </a:r>
-          </a:p>
-          <a:p>
-            <a:endParaRPr lang="en-US" dirty="0"/>
-          </a:p>
-          <a:p>
-            <a:r>
-              <a:rPr lang="en-US" dirty="0" smtClean="0"/>
-              <a:t>Preregister your hypotheses and how you will test them. You will save yourself a lot of time in the long </a:t>
-            </a:r>
-            <a:r>
-              <a:rPr lang="en-US" dirty="0" smtClean="0"/>
-              <a:t>run, feel better about your research, and your null results will mean something.</a:t>
+            <a:r>
+              <a:rPr lang="en-US" dirty="0" smtClean="0"/>
+              <a:t>You can get honest and interesting null results published.</a:t>
             </a:r>
             <a:endParaRPr lang="en-US" dirty="0"/>
           </a:p>
@@ -8018,7 +8026,7 @@
     </p:spTree>
     <p:extLst>
       <p:ext uri="{BB962C8B-B14F-4D97-AF65-F5344CB8AC3E}">
-        <p14:creationId xmlns:p14="http://schemas.microsoft.com/office/powerpoint/2010/main" val="126585807"/>
+        <p14:creationId xmlns:p14="http://schemas.microsoft.com/office/powerpoint/2010/main" val="458402555"/>
       </p:ext>
     </p:extLst>
   </p:cSld>
@@ -8054,12 +8062,12 @@
       </p:grpSpPr>
       <p:sp>
         <p:nvSpPr>
-          <p:cNvPr id="5" name="Text Placeholder 4"/>
-          <p:cNvSpPr>
-            <a:spLocks noGrp="1"/>
-          </p:cNvSpPr>
-          <p:nvPr>
-            <p:ph type="body" idx="1"/>
+          <p:cNvPr id="2" name="Title 1"/>
+          <p:cNvSpPr>
+            <a:spLocks noGrp="1"/>
+          </p:cNvSpPr>
+          <p:nvPr>
+            <p:ph type="title"/>
           </p:nvPr>
         </p:nvSpPr>
         <p:spPr/>
@@ -8067,18 +8075,22 @@
           <a:bodyPr/>
           <a:lstStyle/>
           <a:p>
-            <a:endParaRPr lang="en-US"/>
-          </a:p>
-        </p:txBody>
-      </p:sp>
-      <p:sp>
-        <p:nvSpPr>
-          <p:cNvPr id="4" name="Title 3"/>
-          <p:cNvSpPr>
-            <a:spLocks noGrp="1"/>
-          </p:cNvSpPr>
-          <p:nvPr>
-            <p:ph type="title"/>
+            <a:r>
+              <a:rPr lang="en-US" dirty="0" smtClean="0"/>
+              <a:t>Being Honest</a:t>
+            </a:r>
+            <a:endParaRPr lang="en-US" dirty="0"/>
+          </a:p>
+        </p:txBody>
+      </p:sp>
+      <p:sp>
+        <p:nvSpPr>
+          <p:cNvPr id="3" name="Content Placeholder 2"/>
+          <p:cNvSpPr>
+            <a:spLocks noGrp="1"/>
+          </p:cNvSpPr>
+          <p:nvPr>
+            <p:ph sz="quarter" idx="1"/>
           </p:nvPr>
         </p:nvSpPr>
         <p:spPr/>
@@ -8088,7 +8100,45 @@
           <a:p>
             <a:r>
               <a:rPr lang="en-US" dirty="0" smtClean="0"/>
-              <a:t>P-value Isn’t Everything</a:t>
+              <a:t>There’s a lot of crap going on out there.</a:t>
+            </a:r>
+          </a:p>
+          <a:p>
+            <a:pPr lvl="1"/>
+            <a:r>
+              <a:rPr lang="en-US" dirty="0" err="1" smtClean="0"/>
+              <a:t>HARKing</a:t>
+            </a:r>
+            <a:endParaRPr lang="en-US" dirty="0" smtClean="0"/>
+          </a:p>
+          <a:p>
+            <a:pPr lvl="1"/>
+            <a:r>
+              <a:rPr lang="en-US" dirty="0" smtClean="0"/>
+              <a:t>Moderator munging</a:t>
+            </a:r>
+          </a:p>
+          <a:p>
+            <a:pPr lvl="1"/>
+            <a:r>
+              <a:rPr lang="en-US" dirty="0" smtClean="0"/>
+              <a:t>Optional stopping</a:t>
+            </a:r>
+          </a:p>
+          <a:p>
+            <a:pPr lvl="1"/>
+            <a:r>
+              <a:rPr lang="en-US" dirty="0" smtClean="0"/>
+              <a:t>One-tailed tests (even F-tests!)</a:t>
+            </a:r>
+          </a:p>
+          <a:p>
+            <a:endParaRPr lang="en-US" dirty="0"/>
+          </a:p>
+          <a:p>
+            <a:r>
+              <a:rPr lang="en-US" dirty="0" smtClean="0"/>
+              <a:t>Preregister your hypotheses and how you will test them. You will save yourself a lot of time in the long run, feel better about your research, and your null results will mean something.</a:t>
             </a:r>
             <a:endParaRPr lang="en-US" dirty="0"/>
           </a:p>
@@ -8097,7 +8147,7 @@
     </p:spTree>
     <p:extLst>
       <p:ext uri="{BB962C8B-B14F-4D97-AF65-F5344CB8AC3E}">
-        <p14:creationId xmlns:p14="http://schemas.microsoft.com/office/powerpoint/2010/main" val="1238261931"/>
+        <p14:creationId xmlns:p14="http://schemas.microsoft.com/office/powerpoint/2010/main" val="126585807"/>
       </p:ext>
     </p:extLst>
   </p:cSld>
@@ -8133,6 +8183,85 @@
       </p:grpSpPr>
       <p:sp>
         <p:nvSpPr>
+          <p:cNvPr id="5" name="Text Placeholder 4"/>
+          <p:cNvSpPr>
+            <a:spLocks noGrp="1"/>
+          </p:cNvSpPr>
+          <p:nvPr>
+            <p:ph type="body" idx="1"/>
+          </p:nvPr>
+        </p:nvSpPr>
+        <p:spPr/>
+        <p:txBody>
+          <a:bodyPr/>
+          <a:lstStyle/>
+          <a:p>
+            <a:endParaRPr lang="en-US"/>
+          </a:p>
+        </p:txBody>
+      </p:sp>
+      <p:sp>
+        <p:nvSpPr>
+          <p:cNvPr id="4" name="Title 3"/>
+          <p:cNvSpPr>
+            <a:spLocks noGrp="1"/>
+          </p:cNvSpPr>
+          <p:nvPr>
+            <p:ph type="title"/>
+          </p:nvPr>
+        </p:nvSpPr>
+        <p:spPr/>
+        <p:txBody>
+          <a:bodyPr/>
+          <a:lstStyle/>
+          <a:p>
+            <a:r>
+              <a:rPr lang="en-US" dirty="0" smtClean="0"/>
+              <a:t>P-value Isn’t Everything</a:t>
+            </a:r>
+            <a:endParaRPr lang="en-US" dirty="0"/>
+          </a:p>
+        </p:txBody>
+      </p:sp>
+    </p:spTree>
+    <p:extLst>
+      <p:ext uri="{BB962C8B-B14F-4D97-AF65-F5344CB8AC3E}">
+        <p14:creationId xmlns:p14="http://schemas.microsoft.com/office/powerpoint/2010/main" val="1238261931"/>
+      </p:ext>
+    </p:extLst>
+  </p:cSld>
+  <p:clrMapOvr>
+    <a:masterClrMapping/>
+  </p:clrMapOvr>
+  <p:timing>
+    <p:tnLst>
+      <p:par>
+        <p:cTn id="1" dur="indefinite" restart="never" nodeType="tmRoot"/>
+      </p:par>
+    </p:tnLst>
+  </p:timing>
+</p:sld>
+</file>
+
+<file path=ppt/slides/slide28.xml><?xml version="1.0" encoding="utf-8"?>
+<p:sld xmlns:a="http://schemas.openxmlformats.org/drawingml/2006/main" xmlns:r="http://schemas.openxmlformats.org/officeDocument/2006/relationships" xmlns:p="http://schemas.openxmlformats.org/presentationml/2006/main">
+  <p:cSld>
+    <p:spTree>
+      <p:nvGrpSpPr>
+        <p:cNvPr id="1" name=""/>
+        <p:cNvGrpSpPr/>
+        <p:nvPr/>
+      </p:nvGrpSpPr>
+      <p:grpSpPr>
+        <a:xfrm>
+          <a:off x="0" y="0"/>
+          <a:ext cx="0" cy="0"/>
+          <a:chOff x="0" y="0"/>
+          <a:chExt cx="0" cy="0"/>
+        </a:xfrm>
+      </p:grpSpPr>
+      <p:sp>
+        <p:nvSpPr>
           <p:cNvPr id="4" name="Title 3"/>
           <p:cNvSpPr>
             <a:spLocks noGrp="1"/>
@@ -8209,23 +8338,7 @@
           <a:p>
             <a:r>
               <a:rPr lang="en-US" dirty="0" smtClean="0"/>
-              <a:t>Sometimes you run a </a:t>
-            </a:r>
-            <a:r>
-              <a:rPr lang="en-US" dirty="0" smtClean="0"/>
-              <a:t>great </a:t>
-            </a:r>
-            <a:r>
-              <a:rPr lang="en-US" dirty="0" smtClean="0"/>
-              <a:t>experiment and </a:t>
-            </a:r>
-            <a:r>
-              <a:rPr lang="en-US" dirty="0" smtClean="0"/>
-              <a:t>but you get only a </a:t>
-            </a:r>
-            <a:r>
-              <a:rPr lang="en-US" dirty="0" smtClean="0"/>
-              <a:t>little evidence. You need to be able to argue that.</a:t>
+              <a:t>Sometimes you run a great experiment and but you get only a little evidence. You need to be able to argue that.</a:t>
             </a:r>
           </a:p>
         </p:txBody>
@@ -8907,7 +9020,7 @@
       </p:grpSpPr>
       <p:sp>
         <p:nvSpPr>
-          <p:cNvPr id="4" name="Title 3"/>
+          <p:cNvPr id="2" name="Title 1"/>
           <p:cNvSpPr>
             <a:spLocks noGrp="1"/>
           </p:cNvSpPr>
@@ -8922,7 +9035,7 @@
           <a:p>
             <a:r>
               <a:rPr lang="en-US" dirty="0" smtClean="0"/>
-              <a:t>Code Hygiene</a:t>
+              <a:t>Data Hygiene</a:t>
             </a:r>
             <a:endParaRPr lang="en-US" dirty="0"/>
           </a:p>
@@ -8930,7 +9043,7 @@
       </p:sp>
       <p:sp>
         <p:nvSpPr>
-          <p:cNvPr id="5" name="Content Placeholder 4"/>
+          <p:cNvPr id="3" name="Content Placeholder 2"/>
           <p:cNvSpPr>
             <a:spLocks noGrp="1"/>
           </p:cNvSpPr>
@@ -8945,71 +9058,44 @@
           <a:p>
             <a:r>
               <a:rPr lang="en-US" dirty="0" smtClean="0"/>
-              <a:t>Version control</a:t>
-            </a:r>
-          </a:p>
-          <a:p>
-            <a:pPr lvl="1"/>
-            <a:r>
-              <a:rPr lang="en-US" dirty="0" smtClean="0"/>
-              <a:t>Use </a:t>
-            </a:r>
-            <a:r>
-              <a:rPr lang="en-US" dirty="0" err="1" smtClean="0"/>
-              <a:t>Git</a:t>
-            </a:r>
-            <a:endParaRPr lang="en-US" dirty="0"/>
-          </a:p>
-          <a:p>
-            <a:pPr lvl="1"/>
-            <a:r>
-              <a:rPr lang="en-US" dirty="0" smtClean="0"/>
-              <a:t>Dropbox and OSF also have an amount of </a:t>
-            </a:r>
-            <a:r>
-              <a:rPr lang="en-US" dirty="0" smtClean="0"/>
-              <a:t>version control </a:t>
-            </a:r>
-            <a:r>
-              <a:rPr lang="en-US" dirty="0" smtClean="0"/>
-              <a:t>built in.</a:t>
-            </a:r>
-          </a:p>
-          <a:p>
-            <a:pPr lvl="1"/>
-            <a:r>
-              <a:rPr lang="en-US" dirty="0" smtClean="0"/>
-              <a:t>Use version control instead of having files with names like </a:t>
-            </a:r>
-          </a:p>
-          <a:p>
-            <a:pPr marL="274320" lvl="1" indent="0">
-              <a:buNone/>
-            </a:pPr>
-            <a:r>
-              <a:rPr lang="en-US" dirty="0" smtClean="0"/>
-              <a:t>“firstYearProject_outliersDropped_Winsorized_aggregatedZScore_final_new_reallyfinal.sav”</a:t>
-            </a:r>
+              <a:t>Preserve your data for future generations by putting it on OSF</a:t>
+            </a:r>
+          </a:p>
+          <a:p>
+            <a:r>
+              <a:rPr lang="en-US" dirty="0" smtClean="0"/>
+              <a:t>Other people are going to want to look at your data, either to check it or to explore other hypotheses.</a:t>
+            </a:r>
+          </a:p>
+          <a:p>
+            <a:r>
+              <a:rPr lang="en-US" dirty="0" smtClean="0"/>
+              <a:t>Meta-analysts are going to need statistics that maybe you didn’t report.</a:t>
+            </a:r>
+          </a:p>
+          <a:p>
+            <a:r>
+              <a:rPr lang="en-US" dirty="0" smtClean="0"/>
+              <a:t>If you work matters, people are going to try to build on it. Make sure the data </a:t>
+            </a:r>
+            <a:r>
+              <a:rPr lang="en-US" smtClean="0"/>
+              <a:t>is somewhere close at hand.</a:t>
+            </a:r>
+            <a:endParaRPr lang="en-US"/>
           </a:p>
         </p:txBody>
       </p:sp>
     </p:spTree>
     <p:extLst>
       <p:ext uri="{BB962C8B-B14F-4D97-AF65-F5344CB8AC3E}">
-        <p14:creationId xmlns:p14="http://schemas.microsoft.com/office/powerpoint/2010/main" val="1347976111"/>
+        <p14:creationId xmlns:p14="http://schemas.microsoft.com/office/powerpoint/2010/main" val="1062909039"/>
       </p:ext>
     </p:extLst>
   </p:cSld>
   <p:clrMapOvr>
     <a:masterClrMapping/>
   </p:clrMapOvr>
-  <p:timing>
-    <p:tnLst>
-      <p:par>
-        <p:cTn id="1" dur="indefinite" restart="never" nodeType="tmRoot"/>
-      </p:par>
-    </p:tnLst>
-  </p:timing>
 </p:sld>
 </file>
 
@@ -9032,7 +9118,7 @@
       </p:grpSpPr>
       <p:sp>
         <p:nvSpPr>
-          <p:cNvPr id="2" name="Title 1"/>
+          <p:cNvPr id="4" name="Title 3"/>
           <p:cNvSpPr>
             <a:spLocks noGrp="1"/>
           </p:cNvSpPr>
@@ -9055,7 +9141,7 @@
       </p:sp>
       <p:sp>
         <p:nvSpPr>
-          <p:cNvPr id="3" name="Content Placeholder 2"/>
+          <p:cNvPr id="5" name="Content Placeholder 4"/>
           <p:cNvSpPr>
             <a:spLocks noGrp="1"/>
           </p:cNvSpPr>
@@ -9070,70 +9156,50 @@
           <a:p>
             <a:r>
               <a:rPr lang="en-US" dirty="0" smtClean="0"/>
-              <a:t>Make scripts that run from top to bottom.</a:t>
+              <a:t>Version control</a:t>
             </a:r>
           </a:p>
           <a:p>
             <a:pPr lvl="1"/>
             <a:r>
               <a:rPr lang="en-US" dirty="0" smtClean="0"/>
-              <a:t>Have a master script that calls the subscripts with </a:t>
-            </a:r>
-            <a:r>
-              <a:rPr lang="en-US" dirty="0" smtClean="0">
-                <a:latin typeface="Courier New" panose="02070309020205020404" pitchFamily="49" charset="0"/>
-                <a:cs typeface="Courier New" panose="02070309020205020404" pitchFamily="49" charset="0"/>
-              </a:rPr>
-              <a:t>source()</a:t>
-            </a:r>
+              <a:t>Use </a:t>
+            </a:r>
+            <a:r>
+              <a:rPr lang="en-US" dirty="0" err="1" smtClean="0"/>
+              <a:t>Git</a:t>
+            </a:r>
+            <a:endParaRPr lang="en-US" dirty="0"/>
           </a:p>
           <a:p>
             <a:pPr lvl="1"/>
             <a:r>
-              <a:rPr lang="en-US" dirty="0" smtClean="0">
-                <a:cs typeface="Courier New" panose="02070309020205020404" pitchFamily="49" charset="0"/>
-              </a:rPr>
-              <a:t>Make sure the script runs from top to bottom before the commit.</a:t>
-            </a:r>
-          </a:p>
-          <a:p>
-            <a:r>
-              <a:rPr lang="en-US" dirty="0" smtClean="0">
-                <a:cs typeface="Courier New" panose="02070309020205020404" pitchFamily="49" charset="0"/>
-              </a:rPr>
-              <a:t>Don’t use the command prompt.</a:t>
+              <a:rPr lang="en-US" dirty="0" smtClean="0"/>
+              <a:t>Dropbox and OSF also have an amount of version control built in.</a:t>
             </a:r>
           </a:p>
           <a:p>
             <a:pPr lvl="1"/>
             <a:r>
-              <a:rPr lang="en-US" dirty="0" smtClean="0">
-                <a:cs typeface="Courier New" panose="02070309020205020404" pitchFamily="49" charset="0"/>
-              </a:rPr>
-              <a:t>I call this “</a:t>
-            </a:r>
-            <a:r>
-              <a:rPr lang="en-US" dirty="0" err="1" smtClean="0">
-                <a:cs typeface="Courier New" panose="02070309020205020404" pitchFamily="49" charset="0"/>
-              </a:rPr>
-              <a:t>barebacking</a:t>
-            </a:r>
-            <a:r>
-              <a:rPr lang="en-US" dirty="0" smtClean="0">
-                <a:cs typeface="Courier New" panose="02070309020205020404" pitchFamily="49" charset="0"/>
-              </a:rPr>
-              <a:t>” – it’s about as dangerous and about as smart.</a:t>
-            </a:r>
-            <a:endParaRPr lang="en-US" dirty="0">
-              <a:cs typeface="Courier New" panose="02070309020205020404" pitchFamily="49" charset="0"/>
-            </a:endParaRPr>
+              <a:rPr lang="en-US" dirty="0" smtClean="0"/>
+              <a:t>Use version control instead of having files with names like </a:t>
+            </a:r>
+          </a:p>
+          <a:p>
+            <a:pPr marL="274320" lvl="1" indent="0">
+              <a:buNone/>
+            </a:pPr>
+            <a:r>
+              <a:rPr lang="en-US" dirty="0" smtClean="0"/>
+              <a:t>“firstYearProject_outliersDropped_Winsorized_aggregatedZScore_final_new_reallyfinal.sav”</a:t>
+            </a:r>
           </a:p>
         </p:txBody>
       </p:sp>
     </p:spTree>
     <p:extLst>
       <p:ext uri="{BB962C8B-B14F-4D97-AF65-F5344CB8AC3E}">
-        <p14:creationId xmlns:p14="http://schemas.microsoft.com/office/powerpoint/2010/main" val="1166675622"/>
+        <p14:creationId xmlns:p14="http://schemas.microsoft.com/office/powerpoint/2010/main" val="1347976111"/>
       </p:ext>
     </p:extLst>
   </p:cSld>

</xml_diff>